<commit_message>
seção 2 challanges dowload
</commit_message>
<xml_diff>
--- a/seção 2 - SQL Statement Fundamentals/general+challenge+1.pptx
+++ b/seção 2 - SQL Statement Fundamentals/general+challenge+1.pptx
@@ -124,7 +124,52 @@
       </a:defRPr>
     </a:lvl9pPr>
   </p:defaultTextStyle>
+  <p:extLst>
+    <p:ext uri="{EFAFB233-063F-42B5-8137-9DF3F51BA10A}">
+      <p15:sldGuideLst xmlns:p15="http://schemas.microsoft.com/office/powerpoint/2012/main">
+        <p15:guide id="1" orient="horz" pos="1620">
+          <p15:clr>
+            <a:srgbClr val="A4A3A4"/>
+          </p15:clr>
+        </p15:guide>
+        <p15:guide id="2" pos="2880">
+          <p15:clr>
+            <a:srgbClr val="A4A3A4"/>
+          </p15:clr>
+        </p15:guide>
+      </p15:sldGuideLst>
+    </p:ext>
+  </p:extLst>
 </p:presentation>
+</file>
+
+<file path=ppt/changesInfos/changesInfo1.xml><?xml version="1.0" encoding="utf-8"?>
+<pc:chgInfo xmlns:a="http://schemas.openxmlformats.org/drawingml/2006/main" xmlns:r="http://schemas.openxmlformats.org/officeDocument/2006/relationships" xmlns:ac="http://schemas.microsoft.com/office/drawing/2013/main/command" xmlns:pc="http://schemas.microsoft.com/office/powerpoint/2013/main/command">
+  <pc:docChgLst>
+    <pc:chgData name="Giovanna BA" userId="f2767504aa4763c2" providerId="LiveId" clId="{18D5E86D-8428-40F4-A381-11DDC3902930}"/>
+    <pc:docChg chg="modSld">
+      <pc:chgData name="Giovanna BA" userId="f2767504aa4763c2" providerId="LiveId" clId="{18D5E86D-8428-40F4-A381-11DDC3902930}" dt="2023-08-16T14:11:10.408" v="2" actId="20577"/>
+      <pc:docMkLst>
+        <pc:docMk/>
+      </pc:docMkLst>
+      <pc:sldChg chg="modSp mod">
+        <pc:chgData name="Giovanna BA" userId="f2767504aa4763c2" providerId="LiveId" clId="{18D5E86D-8428-40F4-A381-11DDC3902930}" dt="2023-08-16T14:11:10.408" v="2" actId="20577"/>
+        <pc:sldMkLst>
+          <pc:docMk/>
+          <pc:sldMk cId="1530088763" sldId="256"/>
+        </pc:sldMkLst>
+        <pc:spChg chg="mod">
+          <ac:chgData name="Giovanna BA" userId="f2767504aa4763c2" providerId="LiveId" clId="{18D5E86D-8428-40F4-A381-11DDC3902930}" dt="2023-08-16T14:11:10.408" v="2" actId="20577"/>
+          <ac:spMkLst>
+            <pc:docMk/>
+            <pc:sldMk cId="1530088763" sldId="256"/>
+            <ac:spMk id="2" creationId="{00000000-0000-0000-0000-000000000000}"/>
+          </ac:spMkLst>
+        </pc:spChg>
+      </pc:sldChg>
+    </pc:docChg>
+  </pc:docChgLst>
+</pc:chgInfo>
 </file>
 
 <file path=ppt/slideLayouts/slideLayout1.xml><?xml version="1.0" encoding="utf-8"?>
@@ -165,10 +210,9 @@
           <a:lstStyle/>
           <a:p>
             <a:r>
-              <a:rPr lang="en-US" smtClean="0"/>
+              <a:rPr lang="en-US"/>
               <a:t>Click to edit Master title style</a:t>
             </a:r>
-            <a:endParaRPr lang="en-US"/>
           </a:p>
         </p:txBody>
       </p:sp>
@@ -284,10 +328,9 @@
           </a:lstStyle>
           <a:p>
             <a:r>
-              <a:rPr lang="en-US" smtClean="0"/>
+              <a:rPr lang="en-US"/>
               <a:t>Click to edit Master subtitle style</a:t>
             </a:r>
-            <a:endParaRPr lang="en-US"/>
           </a:p>
         </p:txBody>
       </p:sp>
@@ -308,7 +351,7 @@
           <a:p>
             <a:fld id="{1F82283D-F39B-493F-A144-AD1055C9CE7B}" type="datetimeFigureOut">
               <a:rPr lang="en-US" smtClean="0"/>
-              <a:t>3/11/2016</a:t>
+              <a:t>8/16/2023</a:t>
             </a:fld>
             <a:endParaRPr lang="en-US"/>
           </a:p>
@@ -350,7 +393,7 @@
           <a:p>
             <a:fld id="{172E7A52-B82B-4D87-8AAB-B95EB9398D71}" type="slidenum">
               <a:rPr lang="en-US" smtClean="0"/>
-              <a:t>‹#›</a:t>
+              <a:t>‹nº›</a:t>
             </a:fld>
             <a:endParaRPr lang="en-US"/>
           </a:p>
@@ -402,10 +445,9 @@
           <a:lstStyle/>
           <a:p>
             <a:r>
-              <a:rPr lang="en-US" smtClean="0"/>
+              <a:rPr lang="en-US"/>
               <a:t>Click to edit Master title style</a:t>
             </a:r>
-            <a:endParaRPr lang="en-US"/>
           </a:p>
         </p:txBody>
       </p:sp>
@@ -426,38 +468,37 @@
           <a:p>
             <a:pPr lvl="0"/>
             <a:r>
-              <a:rPr lang="en-US" smtClean="0"/>
+              <a:rPr lang="en-US"/>
               <a:t>Click to edit Master text styles</a:t>
             </a:r>
           </a:p>
           <a:p>
             <a:pPr lvl="1"/>
             <a:r>
-              <a:rPr lang="en-US" smtClean="0"/>
+              <a:rPr lang="en-US"/>
               <a:t>Second level</a:t>
             </a:r>
           </a:p>
           <a:p>
             <a:pPr lvl="2"/>
             <a:r>
-              <a:rPr lang="en-US" smtClean="0"/>
+              <a:rPr lang="en-US"/>
               <a:t>Third level</a:t>
             </a:r>
           </a:p>
           <a:p>
             <a:pPr lvl="3"/>
             <a:r>
-              <a:rPr lang="en-US" smtClean="0"/>
+              <a:rPr lang="en-US"/>
               <a:t>Fourth level</a:t>
             </a:r>
           </a:p>
           <a:p>
             <a:pPr lvl="4"/>
             <a:r>
-              <a:rPr lang="en-US" smtClean="0"/>
+              <a:rPr lang="en-US"/>
               <a:t>Fifth level</a:t>
             </a:r>
-            <a:endParaRPr lang="en-US"/>
           </a:p>
         </p:txBody>
       </p:sp>
@@ -478,7 +519,7 @@
           <a:p>
             <a:fld id="{1F82283D-F39B-493F-A144-AD1055C9CE7B}" type="datetimeFigureOut">
               <a:rPr lang="en-US" smtClean="0"/>
-              <a:t>3/11/2016</a:t>
+              <a:t>8/16/2023</a:t>
             </a:fld>
             <a:endParaRPr lang="en-US"/>
           </a:p>
@@ -520,7 +561,7 @@
           <a:p>
             <a:fld id="{172E7A52-B82B-4D87-8AAB-B95EB9398D71}" type="slidenum">
               <a:rPr lang="en-US" smtClean="0"/>
-              <a:t>‹#›</a:t>
+              <a:t>‹nº›</a:t>
             </a:fld>
             <a:endParaRPr lang="en-US"/>
           </a:p>
@@ -577,10 +618,9 @@
           <a:lstStyle/>
           <a:p>
             <a:r>
-              <a:rPr lang="en-US" smtClean="0"/>
+              <a:rPr lang="en-US"/>
               <a:t>Click to edit Master title style</a:t>
             </a:r>
-            <a:endParaRPr lang="en-US"/>
           </a:p>
         </p:txBody>
       </p:sp>
@@ -606,38 +646,37 @@
           <a:p>
             <a:pPr lvl="0"/>
             <a:r>
-              <a:rPr lang="en-US" smtClean="0"/>
+              <a:rPr lang="en-US"/>
               <a:t>Click to edit Master text styles</a:t>
             </a:r>
           </a:p>
           <a:p>
             <a:pPr lvl="1"/>
             <a:r>
-              <a:rPr lang="en-US" smtClean="0"/>
+              <a:rPr lang="en-US"/>
               <a:t>Second level</a:t>
             </a:r>
           </a:p>
           <a:p>
             <a:pPr lvl="2"/>
             <a:r>
-              <a:rPr lang="en-US" smtClean="0"/>
+              <a:rPr lang="en-US"/>
               <a:t>Third level</a:t>
             </a:r>
           </a:p>
           <a:p>
             <a:pPr lvl="3"/>
             <a:r>
-              <a:rPr lang="en-US" smtClean="0"/>
+              <a:rPr lang="en-US"/>
               <a:t>Fourth level</a:t>
             </a:r>
           </a:p>
           <a:p>
             <a:pPr lvl="4"/>
             <a:r>
-              <a:rPr lang="en-US" smtClean="0"/>
+              <a:rPr lang="en-US"/>
               <a:t>Fifth level</a:t>
             </a:r>
-            <a:endParaRPr lang="en-US"/>
           </a:p>
         </p:txBody>
       </p:sp>
@@ -658,7 +697,7 @@
           <a:p>
             <a:fld id="{1F82283D-F39B-493F-A144-AD1055C9CE7B}" type="datetimeFigureOut">
               <a:rPr lang="en-US" smtClean="0"/>
-              <a:t>3/11/2016</a:t>
+              <a:t>8/16/2023</a:t>
             </a:fld>
             <a:endParaRPr lang="en-US"/>
           </a:p>
@@ -700,7 +739,7 @@
           <a:p>
             <a:fld id="{172E7A52-B82B-4D87-8AAB-B95EB9398D71}" type="slidenum">
               <a:rPr lang="en-US" smtClean="0"/>
-              <a:t>‹#›</a:t>
+              <a:t>‹nº›</a:t>
             </a:fld>
             <a:endParaRPr lang="en-US"/>
           </a:p>
@@ -752,10 +791,9 @@
           <a:lstStyle/>
           <a:p>
             <a:r>
-              <a:rPr lang="en-US" smtClean="0"/>
+              <a:rPr lang="en-US"/>
               <a:t>Click to edit Master title style</a:t>
             </a:r>
-            <a:endParaRPr lang="en-US"/>
           </a:p>
         </p:txBody>
       </p:sp>
@@ -776,38 +814,37 @@
           <a:p>
             <a:pPr lvl="0"/>
             <a:r>
-              <a:rPr lang="en-US" smtClean="0"/>
+              <a:rPr lang="en-US"/>
               <a:t>Click to edit Master text styles</a:t>
             </a:r>
           </a:p>
           <a:p>
             <a:pPr lvl="1"/>
             <a:r>
-              <a:rPr lang="en-US" smtClean="0"/>
+              <a:rPr lang="en-US"/>
               <a:t>Second level</a:t>
             </a:r>
           </a:p>
           <a:p>
             <a:pPr lvl="2"/>
             <a:r>
-              <a:rPr lang="en-US" smtClean="0"/>
+              <a:rPr lang="en-US"/>
               <a:t>Third level</a:t>
             </a:r>
           </a:p>
           <a:p>
             <a:pPr lvl="3"/>
             <a:r>
-              <a:rPr lang="en-US" smtClean="0"/>
+              <a:rPr lang="en-US"/>
               <a:t>Fourth level</a:t>
             </a:r>
           </a:p>
           <a:p>
             <a:pPr lvl="4"/>
             <a:r>
-              <a:rPr lang="en-US" smtClean="0"/>
+              <a:rPr lang="en-US"/>
               <a:t>Fifth level</a:t>
             </a:r>
-            <a:endParaRPr lang="en-US"/>
           </a:p>
         </p:txBody>
       </p:sp>
@@ -828,7 +865,7 @@
           <a:p>
             <a:fld id="{1F82283D-F39B-493F-A144-AD1055C9CE7B}" type="datetimeFigureOut">
               <a:rPr lang="en-US" smtClean="0"/>
-              <a:t>3/11/2016</a:t>
+              <a:t>8/16/2023</a:t>
             </a:fld>
             <a:endParaRPr lang="en-US"/>
           </a:p>
@@ -870,7 +907,7 @@
           <a:p>
             <a:fld id="{172E7A52-B82B-4D87-8AAB-B95EB9398D71}" type="slidenum">
               <a:rPr lang="en-US" smtClean="0"/>
-              <a:t>‹#›</a:t>
+              <a:t>‹nº›</a:t>
             </a:fld>
             <a:endParaRPr lang="en-US"/>
           </a:p>
@@ -931,10 +968,9 @@
           </a:lstStyle>
           <a:p>
             <a:r>
-              <a:rPr lang="en-US" smtClean="0"/>
+              <a:rPr lang="en-US"/>
               <a:t>Click to edit Master title style</a:t>
             </a:r>
-            <a:endParaRPr lang="en-US"/>
           </a:p>
         </p:txBody>
       </p:sp>
@@ -1051,7 +1087,7 @@
           <a:p>
             <a:pPr lvl="0"/>
             <a:r>
-              <a:rPr lang="en-US" smtClean="0"/>
+              <a:rPr lang="en-US"/>
               <a:t>Click to edit Master text styles</a:t>
             </a:r>
           </a:p>
@@ -1074,7 +1110,7 @@
           <a:p>
             <a:fld id="{1F82283D-F39B-493F-A144-AD1055C9CE7B}" type="datetimeFigureOut">
               <a:rPr lang="en-US" smtClean="0"/>
-              <a:t>3/11/2016</a:t>
+              <a:t>8/16/2023</a:t>
             </a:fld>
             <a:endParaRPr lang="en-US"/>
           </a:p>
@@ -1116,7 +1152,7 @@
           <a:p>
             <a:fld id="{172E7A52-B82B-4D87-8AAB-B95EB9398D71}" type="slidenum">
               <a:rPr lang="en-US" smtClean="0"/>
-              <a:t>‹#›</a:t>
+              <a:t>‹nº›</a:t>
             </a:fld>
             <a:endParaRPr lang="en-US"/>
           </a:p>
@@ -1168,10 +1204,9 @@
           <a:lstStyle/>
           <a:p>
             <a:r>
-              <a:rPr lang="en-US" smtClean="0"/>
+              <a:rPr lang="en-US"/>
               <a:t>Click to edit Master title style</a:t>
             </a:r>
-            <a:endParaRPr lang="en-US"/>
           </a:p>
         </p:txBody>
       </p:sp>
@@ -1225,38 +1260,37 @@
           <a:p>
             <a:pPr lvl="0"/>
             <a:r>
-              <a:rPr lang="en-US" smtClean="0"/>
+              <a:rPr lang="en-US"/>
               <a:t>Click to edit Master text styles</a:t>
             </a:r>
           </a:p>
           <a:p>
             <a:pPr lvl="1"/>
             <a:r>
-              <a:rPr lang="en-US" smtClean="0"/>
+              <a:rPr lang="en-US"/>
               <a:t>Second level</a:t>
             </a:r>
           </a:p>
           <a:p>
             <a:pPr lvl="2"/>
             <a:r>
-              <a:rPr lang="en-US" smtClean="0"/>
+              <a:rPr lang="en-US"/>
               <a:t>Third level</a:t>
             </a:r>
           </a:p>
           <a:p>
             <a:pPr lvl="3"/>
             <a:r>
-              <a:rPr lang="en-US" smtClean="0"/>
+              <a:rPr lang="en-US"/>
               <a:t>Fourth level</a:t>
             </a:r>
           </a:p>
           <a:p>
             <a:pPr lvl="4"/>
             <a:r>
-              <a:rPr lang="en-US" smtClean="0"/>
+              <a:rPr lang="en-US"/>
               <a:t>Fifth level</a:t>
             </a:r>
-            <a:endParaRPr lang="en-US"/>
           </a:p>
         </p:txBody>
       </p:sp>
@@ -1310,38 +1344,37 @@
           <a:p>
             <a:pPr lvl="0"/>
             <a:r>
-              <a:rPr lang="en-US" smtClean="0"/>
+              <a:rPr lang="en-US"/>
               <a:t>Click to edit Master text styles</a:t>
             </a:r>
           </a:p>
           <a:p>
             <a:pPr lvl="1"/>
             <a:r>
-              <a:rPr lang="en-US" smtClean="0"/>
+              <a:rPr lang="en-US"/>
               <a:t>Second level</a:t>
             </a:r>
           </a:p>
           <a:p>
             <a:pPr lvl="2"/>
             <a:r>
-              <a:rPr lang="en-US" smtClean="0"/>
+              <a:rPr lang="en-US"/>
               <a:t>Third level</a:t>
             </a:r>
           </a:p>
           <a:p>
             <a:pPr lvl="3"/>
             <a:r>
-              <a:rPr lang="en-US" smtClean="0"/>
+              <a:rPr lang="en-US"/>
               <a:t>Fourth level</a:t>
             </a:r>
           </a:p>
           <a:p>
             <a:pPr lvl="4"/>
             <a:r>
-              <a:rPr lang="en-US" smtClean="0"/>
+              <a:rPr lang="en-US"/>
               <a:t>Fifth level</a:t>
             </a:r>
-            <a:endParaRPr lang="en-US"/>
           </a:p>
         </p:txBody>
       </p:sp>
@@ -1362,7 +1395,7 @@
           <a:p>
             <a:fld id="{1F82283D-F39B-493F-A144-AD1055C9CE7B}" type="datetimeFigureOut">
               <a:rPr lang="en-US" smtClean="0"/>
-              <a:t>3/11/2016</a:t>
+              <a:t>8/16/2023</a:t>
             </a:fld>
             <a:endParaRPr lang="en-US"/>
           </a:p>
@@ -1404,7 +1437,7 @@
           <a:p>
             <a:fld id="{172E7A52-B82B-4D87-8AAB-B95EB9398D71}" type="slidenum">
               <a:rPr lang="en-US" smtClean="0"/>
-              <a:t>‹#›</a:t>
+              <a:t>‹nº›</a:t>
             </a:fld>
             <a:endParaRPr lang="en-US"/>
           </a:p>
@@ -1460,10 +1493,9 @@
           </a:lstStyle>
           <a:p>
             <a:r>
-              <a:rPr lang="en-US" smtClean="0"/>
+              <a:rPr lang="en-US"/>
               <a:t>Click to edit Master title style</a:t>
             </a:r>
-            <a:endParaRPr lang="en-US"/>
           </a:p>
         </p:txBody>
       </p:sp>
@@ -1526,7 +1558,7 @@
           <a:p>
             <a:pPr lvl="0"/>
             <a:r>
-              <a:rPr lang="en-US" smtClean="0"/>
+              <a:rPr lang="en-US"/>
               <a:t>Click to edit Master text styles</a:t>
             </a:r>
           </a:p>
@@ -1582,38 +1614,37 @@
           <a:p>
             <a:pPr lvl="0"/>
             <a:r>
-              <a:rPr lang="en-US" smtClean="0"/>
+              <a:rPr lang="en-US"/>
               <a:t>Click to edit Master text styles</a:t>
             </a:r>
           </a:p>
           <a:p>
             <a:pPr lvl="1"/>
             <a:r>
-              <a:rPr lang="en-US" smtClean="0"/>
+              <a:rPr lang="en-US"/>
               <a:t>Second level</a:t>
             </a:r>
           </a:p>
           <a:p>
             <a:pPr lvl="2"/>
             <a:r>
-              <a:rPr lang="en-US" smtClean="0"/>
+              <a:rPr lang="en-US"/>
               <a:t>Third level</a:t>
             </a:r>
           </a:p>
           <a:p>
             <a:pPr lvl="3"/>
             <a:r>
-              <a:rPr lang="en-US" smtClean="0"/>
+              <a:rPr lang="en-US"/>
               <a:t>Fourth level</a:t>
             </a:r>
           </a:p>
           <a:p>
             <a:pPr lvl="4"/>
             <a:r>
-              <a:rPr lang="en-US" smtClean="0"/>
+              <a:rPr lang="en-US"/>
               <a:t>Fifth level</a:t>
             </a:r>
-            <a:endParaRPr lang="en-US"/>
           </a:p>
         </p:txBody>
       </p:sp>
@@ -1676,7 +1707,7 @@
           <a:p>
             <a:pPr lvl="0"/>
             <a:r>
-              <a:rPr lang="en-US" smtClean="0"/>
+              <a:rPr lang="en-US"/>
               <a:t>Click to edit Master text styles</a:t>
             </a:r>
           </a:p>
@@ -1732,38 +1763,37 @@
           <a:p>
             <a:pPr lvl="0"/>
             <a:r>
-              <a:rPr lang="en-US" smtClean="0"/>
+              <a:rPr lang="en-US"/>
               <a:t>Click to edit Master text styles</a:t>
             </a:r>
           </a:p>
           <a:p>
             <a:pPr lvl="1"/>
             <a:r>
-              <a:rPr lang="en-US" smtClean="0"/>
+              <a:rPr lang="en-US"/>
               <a:t>Second level</a:t>
             </a:r>
           </a:p>
           <a:p>
             <a:pPr lvl="2"/>
             <a:r>
-              <a:rPr lang="en-US" smtClean="0"/>
+              <a:rPr lang="en-US"/>
               <a:t>Third level</a:t>
             </a:r>
           </a:p>
           <a:p>
             <a:pPr lvl="3"/>
             <a:r>
-              <a:rPr lang="en-US" smtClean="0"/>
+              <a:rPr lang="en-US"/>
               <a:t>Fourth level</a:t>
             </a:r>
           </a:p>
           <a:p>
             <a:pPr lvl="4"/>
             <a:r>
-              <a:rPr lang="en-US" smtClean="0"/>
+              <a:rPr lang="en-US"/>
               <a:t>Fifth level</a:t>
             </a:r>
-            <a:endParaRPr lang="en-US"/>
           </a:p>
         </p:txBody>
       </p:sp>
@@ -1784,7 +1814,7 @@
           <a:p>
             <a:fld id="{1F82283D-F39B-493F-A144-AD1055C9CE7B}" type="datetimeFigureOut">
               <a:rPr lang="en-US" smtClean="0"/>
-              <a:t>3/11/2016</a:t>
+              <a:t>8/16/2023</a:t>
             </a:fld>
             <a:endParaRPr lang="en-US"/>
           </a:p>
@@ -1826,7 +1856,7 @@
           <a:p>
             <a:fld id="{172E7A52-B82B-4D87-8AAB-B95EB9398D71}" type="slidenum">
               <a:rPr lang="en-US" smtClean="0"/>
-              <a:t>‹#›</a:t>
+              <a:t>‹nº›</a:t>
             </a:fld>
             <a:endParaRPr lang="en-US"/>
           </a:p>
@@ -1878,10 +1908,9 @@
           <a:lstStyle/>
           <a:p>
             <a:r>
-              <a:rPr lang="en-US" smtClean="0"/>
+              <a:rPr lang="en-US"/>
               <a:t>Click to edit Master title style</a:t>
             </a:r>
-            <a:endParaRPr lang="en-US"/>
           </a:p>
         </p:txBody>
       </p:sp>
@@ -1902,7 +1931,7 @@
           <a:p>
             <a:fld id="{1F82283D-F39B-493F-A144-AD1055C9CE7B}" type="datetimeFigureOut">
               <a:rPr lang="en-US" smtClean="0"/>
-              <a:t>3/11/2016</a:t>
+              <a:t>8/16/2023</a:t>
             </a:fld>
             <a:endParaRPr lang="en-US"/>
           </a:p>
@@ -1944,7 +1973,7 @@
           <a:p>
             <a:fld id="{172E7A52-B82B-4D87-8AAB-B95EB9398D71}" type="slidenum">
               <a:rPr lang="en-US" smtClean="0"/>
-              <a:t>‹#›</a:t>
+              <a:t>‹nº›</a:t>
             </a:fld>
             <a:endParaRPr lang="en-US"/>
           </a:p>
@@ -1997,7 +2026,7 @@
           <a:p>
             <a:fld id="{1F82283D-F39B-493F-A144-AD1055C9CE7B}" type="datetimeFigureOut">
               <a:rPr lang="en-US" smtClean="0"/>
-              <a:t>3/11/2016</a:t>
+              <a:t>8/16/2023</a:t>
             </a:fld>
             <a:endParaRPr lang="en-US"/>
           </a:p>
@@ -2039,7 +2068,7 @@
           <a:p>
             <a:fld id="{172E7A52-B82B-4D87-8AAB-B95EB9398D71}" type="slidenum">
               <a:rPr lang="en-US" smtClean="0"/>
-              <a:t>‹#›</a:t>
+              <a:t>‹nº›</a:t>
             </a:fld>
             <a:endParaRPr lang="en-US"/>
           </a:p>
@@ -2100,10 +2129,9 @@
           </a:lstStyle>
           <a:p>
             <a:r>
-              <a:rPr lang="en-US" smtClean="0"/>
+              <a:rPr lang="en-US"/>
               <a:t>Click to edit Master title style</a:t>
             </a:r>
-            <a:endParaRPr lang="en-US"/>
           </a:p>
         </p:txBody>
       </p:sp>
@@ -2157,38 +2185,37 @@
           <a:p>
             <a:pPr lvl="0"/>
             <a:r>
-              <a:rPr lang="en-US" smtClean="0"/>
+              <a:rPr lang="en-US"/>
               <a:t>Click to edit Master text styles</a:t>
             </a:r>
           </a:p>
           <a:p>
             <a:pPr lvl="1"/>
             <a:r>
-              <a:rPr lang="en-US" smtClean="0"/>
+              <a:rPr lang="en-US"/>
               <a:t>Second level</a:t>
             </a:r>
           </a:p>
           <a:p>
             <a:pPr lvl="2"/>
             <a:r>
-              <a:rPr lang="en-US" smtClean="0"/>
+              <a:rPr lang="en-US"/>
               <a:t>Third level</a:t>
             </a:r>
           </a:p>
           <a:p>
             <a:pPr lvl="3"/>
             <a:r>
-              <a:rPr lang="en-US" smtClean="0"/>
+              <a:rPr lang="en-US"/>
               <a:t>Fourth level</a:t>
             </a:r>
           </a:p>
           <a:p>
             <a:pPr lvl="4"/>
             <a:r>
-              <a:rPr lang="en-US" smtClean="0"/>
+              <a:rPr lang="en-US"/>
               <a:t>Fifth level</a:t>
             </a:r>
-            <a:endParaRPr lang="en-US"/>
           </a:p>
         </p:txBody>
       </p:sp>
@@ -2251,7 +2278,7 @@
           <a:p>
             <a:pPr lvl="0"/>
             <a:r>
-              <a:rPr lang="en-US" smtClean="0"/>
+              <a:rPr lang="en-US"/>
               <a:t>Click to edit Master text styles</a:t>
             </a:r>
           </a:p>
@@ -2274,7 +2301,7 @@
           <a:p>
             <a:fld id="{1F82283D-F39B-493F-A144-AD1055C9CE7B}" type="datetimeFigureOut">
               <a:rPr lang="en-US" smtClean="0"/>
-              <a:t>3/11/2016</a:t>
+              <a:t>8/16/2023</a:t>
             </a:fld>
             <a:endParaRPr lang="en-US"/>
           </a:p>
@@ -2316,7 +2343,7 @@
           <a:p>
             <a:fld id="{172E7A52-B82B-4D87-8AAB-B95EB9398D71}" type="slidenum">
               <a:rPr lang="en-US" smtClean="0"/>
-              <a:t>‹#›</a:t>
+              <a:t>‹nº›</a:t>
             </a:fld>
             <a:endParaRPr lang="en-US"/>
           </a:p>
@@ -2377,10 +2404,9 @@
           </a:lstStyle>
           <a:p>
             <a:r>
-              <a:rPr lang="en-US" smtClean="0"/>
+              <a:rPr lang="en-US"/>
               <a:t>Click to edit Master title style</a:t>
             </a:r>
-            <a:endParaRPr lang="en-US"/>
           </a:p>
         </p:txBody>
       </p:sp>
@@ -2504,7 +2530,7 @@
           <a:p>
             <a:pPr lvl="0"/>
             <a:r>
-              <a:rPr lang="en-US" smtClean="0"/>
+              <a:rPr lang="en-US"/>
               <a:t>Click to edit Master text styles</a:t>
             </a:r>
           </a:p>
@@ -2527,7 +2553,7 @@
           <a:p>
             <a:fld id="{1F82283D-F39B-493F-A144-AD1055C9CE7B}" type="datetimeFigureOut">
               <a:rPr lang="en-US" smtClean="0"/>
-              <a:t>3/11/2016</a:t>
+              <a:t>8/16/2023</a:t>
             </a:fld>
             <a:endParaRPr lang="en-US"/>
           </a:p>
@@ -2569,7 +2595,7 @@
           <a:p>
             <a:fld id="{172E7A52-B82B-4D87-8AAB-B95EB9398D71}" type="slidenum">
               <a:rPr lang="en-US" smtClean="0"/>
-              <a:t>‹#›</a:t>
+              <a:t>‹nº›</a:t>
             </a:fld>
             <a:endParaRPr lang="en-US"/>
           </a:p>
@@ -2636,10 +2662,9 @@
           <a:lstStyle/>
           <a:p>
             <a:r>
-              <a:rPr lang="en-US" smtClean="0"/>
+              <a:rPr lang="en-US"/>
               <a:t>Click to edit Master title style</a:t>
             </a:r>
-            <a:endParaRPr lang="en-US"/>
           </a:p>
         </p:txBody>
       </p:sp>
@@ -2670,38 +2695,37 @@
           <a:p>
             <a:pPr lvl="0"/>
             <a:r>
-              <a:rPr lang="en-US" smtClean="0"/>
+              <a:rPr lang="en-US"/>
               <a:t>Click to edit Master text styles</a:t>
             </a:r>
           </a:p>
           <a:p>
             <a:pPr lvl="1"/>
             <a:r>
-              <a:rPr lang="en-US" smtClean="0"/>
+              <a:rPr lang="en-US"/>
               <a:t>Second level</a:t>
             </a:r>
           </a:p>
           <a:p>
             <a:pPr lvl="2"/>
             <a:r>
-              <a:rPr lang="en-US" smtClean="0"/>
+              <a:rPr lang="en-US"/>
               <a:t>Third level</a:t>
             </a:r>
           </a:p>
           <a:p>
             <a:pPr lvl="3"/>
             <a:r>
-              <a:rPr lang="en-US" smtClean="0"/>
+              <a:rPr lang="en-US"/>
               <a:t>Fourth level</a:t>
             </a:r>
           </a:p>
           <a:p>
             <a:pPr lvl="4"/>
             <a:r>
-              <a:rPr lang="en-US" smtClean="0"/>
+              <a:rPr lang="en-US"/>
               <a:t>Fifth level</a:t>
             </a:r>
-            <a:endParaRPr lang="en-US"/>
           </a:p>
         </p:txBody>
       </p:sp>
@@ -2740,7 +2764,7 @@
           <a:p>
             <a:fld id="{1F82283D-F39B-493F-A144-AD1055C9CE7B}" type="datetimeFigureOut">
               <a:rPr lang="en-US" smtClean="0"/>
-              <a:t>3/11/2016</a:t>
+              <a:t>8/16/2023</a:t>
             </a:fld>
             <a:endParaRPr lang="en-US"/>
           </a:p>
@@ -2818,7 +2842,7 @@
           <a:p>
             <a:fld id="{172E7A52-B82B-4D87-8AAB-B95EB9398D71}" type="slidenum">
               <a:rPr lang="en-US" smtClean="0"/>
-              <a:t>‹#›</a:t>
+              <a:t>‹nº›</a:t>
             </a:fld>
             <a:endParaRPr lang="en-US"/>
           </a:p>
@@ -3127,7 +3151,7 @@
         </p:nvSpPr>
         <p:spPr>
           <a:xfrm>
-            <a:off x="685800" y="914401"/>
+            <a:off x="762000" y="914401"/>
             <a:ext cx="7772400" cy="1785938"/>
           </a:xfrm>
         </p:spPr>
@@ -3138,15 +3162,11 @@
           <a:lstStyle/>
           <a:p>
             <a:r>
-              <a:rPr lang="en-US" sz="6000" b="1" dirty="0" smtClean="0"/>
+              <a:rPr lang="en-US" sz="6000" b="1" dirty="0"/>
               <a:t>Challenge! </a:t>
             </a:r>
-            <a:r>
-              <a:rPr lang="en-US" sz="6000" b="1" dirty="0" smtClean="0"/>
-              <a:t/>
-            </a:r>
             <a:br>
-              <a:rPr lang="en-US" sz="6000" b="1" dirty="0" smtClean="0"/>
+              <a:rPr lang="en-US" sz="6000" b="1" dirty="0"/>
             </a:br>
             <a:endParaRPr lang="en-US" sz="6000" b="1" dirty="0"/>
           </a:p>
@@ -3181,13 +3201,6 @@
   <p:clrMapOvr>
     <a:masterClrMapping/>
   </p:clrMapOvr>
-  <p:timing>
-    <p:tnLst>
-      <p:par>
-        <p:cTn id="1" dur="indefinite" restart="never" nodeType="tmRoot"/>
-      </p:par>
-    </p:tnLst>
-  </p:timing>
 </p:sld>
 </file>
 
@@ -3224,10 +3237,9 @@
           <a:lstStyle/>
           <a:p>
             <a:r>
-              <a:rPr lang="en-US" dirty="0" smtClean="0"/>
+              <a:rPr lang="en-US" dirty="0"/>
               <a:t>Hints</a:t>
             </a:r>
-            <a:endParaRPr lang="en-US" dirty="0"/>
           </a:p>
         </p:txBody>
       </p:sp>
@@ -3252,7 +3264,7 @@
               <a:buNone/>
             </a:pPr>
             <a:r>
-              <a:rPr lang="en-US" dirty="0" smtClean="0"/>
+              <a:rPr lang="en-US" dirty="0"/>
               <a:t>You will need to use the address table</a:t>
             </a:r>
           </a:p>
@@ -3261,10 +3273,9 @@
               <a:buNone/>
             </a:pPr>
             <a:r>
-              <a:rPr lang="en-US" dirty="0" smtClean="0"/>
+              <a:rPr lang="en-US" dirty="0"/>
               <a:t>You will also need to use COUNT and DISTINCT</a:t>
             </a:r>
-            <a:endParaRPr lang="en-US" dirty="0" smtClean="0"/>
           </a:p>
         </p:txBody>
       </p:sp>
@@ -3278,13 +3289,6 @@
   <p:clrMapOvr>
     <a:masterClrMapping/>
   </p:clrMapOvr>
-  <p:timing>
-    <p:tnLst>
-      <p:par>
-        <p:cTn id="1" dur="indefinite" restart="never" nodeType="tmRoot"/>
-      </p:par>
-    </p:tnLst>
-  </p:timing>
 </p:sld>
 </file>
 
@@ -3321,10 +3325,9 @@
           <a:lstStyle/>
           <a:p>
             <a:r>
-              <a:rPr lang="en-US" dirty="0" smtClean="0"/>
+              <a:rPr lang="en-US" dirty="0"/>
               <a:t>SOLUTION</a:t>
             </a:r>
-            <a:endParaRPr lang="en-US" dirty="0"/>
           </a:p>
         </p:txBody>
       </p:sp>
@@ -3352,21 +3355,15 @@
               <a:rPr lang="en-US" b="1" dirty="0"/>
               <a:t>SELECT COUNT(DISTINCT(district)) </a:t>
             </a:r>
-            <a:endParaRPr lang="en-US" b="1" dirty="0" smtClean="0"/>
           </a:p>
           <a:p>
             <a:pPr marL="0" indent="0">
               <a:buNone/>
             </a:pPr>
             <a:r>
-              <a:rPr lang="en-US" b="1" dirty="0" smtClean="0"/>
-              <a:t>FROM </a:t>
-            </a:r>
-            <a:r>
               <a:rPr lang="en-US" b="1" dirty="0"/>
-              <a:t>address;</a:t>
-            </a:r>
-            <a:endParaRPr lang="en-US" b="1" dirty="0"/>
+              <a:t>FROM address;</a:t>
+            </a:r>
           </a:p>
         </p:txBody>
       </p:sp>
@@ -3380,13 +3377,6 @@
   <p:clrMapOvr>
     <a:masterClrMapping/>
   </p:clrMapOvr>
-  <p:timing>
-    <p:tnLst>
-      <p:par>
-        <p:cTn id="1" dur="indefinite" restart="never" nodeType="tmRoot"/>
-      </p:par>
-    </p:tnLst>
-  </p:timing>
 </p:sld>
 </file>
 
@@ -3423,10 +3413,9 @@
           <a:lstStyle/>
           <a:p>
             <a:r>
-              <a:rPr lang="en-US" dirty="0" smtClean="0"/>
+              <a:rPr lang="en-US" dirty="0"/>
               <a:t>Challenge </a:t>
             </a:r>
-            <a:endParaRPr lang="en-US" dirty="0"/>
           </a:p>
         </p:txBody>
       </p:sp>
@@ -3448,10 +3437,9 @@
           <a:lstStyle/>
           <a:p>
             <a:r>
-              <a:rPr lang="en-US" dirty="0" smtClean="0"/>
+              <a:rPr lang="en-US" dirty="0"/>
               <a:t>Retrieve the list of names for those distinct districts from the previous question.</a:t>
             </a:r>
-            <a:endParaRPr lang="en-US" dirty="0" smtClean="0"/>
           </a:p>
         </p:txBody>
       </p:sp>
@@ -3465,13 +3453,6 @@
   <p:clrMapOvr>
     <a:masterClrMapping/>
   </p:clrMapOvr>
-  <p:timing>
-    <p:tnLst>
-      <p:par>
-        <p:cTn id="1" dur="indefinite" restart="never" nodeType="tmRoot"/>
-      </p:par>
-    </p:tnLst>
-  </p:timing>
 </p:sld>
 </file>
 
@@ -3508,10 +3489,9 @@
           <a:lstStyle/>
           <a:p>
             <a:r>
-              <a:rPr lang="en-US" dirty="0" smtClean="0"/>
+              <a:rPr lang="en-US" dirty="0"/>
               <a:t>Hints</a:t>
             </a:r>
-            <a:endParaRPr lang="en-US" dirty="0"/>
           </a:p>
         </p:txBody>
       </p:sp>
@@ -3536,7 +3516,7 @@
               <a:buNone/>
             </a:pPr>
             <a:r>
-              <a:rPr lang="en-US" dirty="0" smtClean="0"/>
+              <a:rPr lang="en-US" dirty="0"/>
               <a:t>You will again need to use the address table</a:t>
             </a:r>
           </a:p>
@@ -3545,10 +3525,9 @@
               <a:buNone/>
             </a:pPr>
             <a:r>
-              <a:rPr lang="en-US" dirty="0" smtClean="0"/>
+              <a:rPr lang="en-US" dirty="0"/>
               <a:t>This will be very similar to the previous challenge</a:t>
             </a:r>
-            <a:endParaRPr lang="en-US" dirty="0" smtClean="0"/>
           </a:p>
         </p:txBody>
       </p:sp>
@@ -3562,13 +3541,6 @@
   <p:clrMapOvr>
     <a:masterClrMapping/>
   </p:clrMapOvr>
-  <p:timing>
-    <p:tnLst>
-      <p:par>
-        <p:cTn id="1" dur="indefinite" restart="never" nodeType="tmRoot"/>
-      </p:par>
-    </p:tnLst>
-  </p:timing>
 </p:sld>
 </file>
 
@@ -3605,10 +3577,9 @@
           <a:lstStyle/>
           <a:p>
             <a:r>
-              <a:rPr lang="en-US" dirty="0" smtClean="0"/>
+              <a:rPr lang="en-US" dirty="0"/>
               <a:t>SOLUTION</a:t>
             </a:r>
-            <a:endParaRPr lang="en-US" dirty="0"/>
           </a:p>
         </p:txBody>
       </p:sp>
@@ -3636,7 +3607,6 @@
               <a:rPr lang="en-US" b="1" dirty="0"/>
               <a:t>SELECT DISTINCT(district) FROM address;</a:t>
             </a:r>
-            <a:endParaRPr lang="en-US" b="1" dirty="0"/>
           </a:p>
         </p:txBody>
       </p:sp>
@@ -3650,13 +3620,6 @@
   <p:clrMapOvr>
     <a:masterClrMapping/>
   </p:clrMapOvr>
-  <p:timing>
-    <p:tnLst>
-      <p:par>
-        <p:cTn id="1" dur="indefinite" restart="never" nodeType="tmRoot"/>
-      </p:par>
-    </p:tnLst>
-  </p:timing>
 </p:sld>
 </file>
 
@@ -3693,10 +3656,9 @@
           <a:lstStyle/>
           <a:p>
             <a:r>
-              <a:rPr lang="en-US" dirty="0" smtClean="0"/>
+              <a:rPr lang="en-US" dirty="0"/>
               <a:t>Challenge </a:t>
             </a:r>
-            <a:endParaRPr lang="en-US" dirty="0"/>
           </a:p>
         </p:txBody>
       </p:sp>
@@ -3718,10 +3680,9 @@
           <a:lstStyle/>
           <a:p>
             <a:r>
-              <a:rPr lang="en-US" dirty="0" smtClean="0"/>
+              <a:rPr lang="en-US" dirty="0"/>
               <a:t>How many films have a rating of R and a replacement cost between $5 and $15?</a:t>
             </a:r>
-            <a:endParaRPr lang="en-US" dirty="0" smtClean="0"/>
           </a:p>
         </p:txBody>
       </p:sp>
@@ -3735,13 +3696,6 @@
   <p:clrMapOvr>
     <a:masterClrMapping/>
   </p:clrMapOvr>
-  <p:timing>
-    <p:tnLst>
-      <p:par>
-        <p:cTn id="1" dur="indefinite" restart="never" nodeType="tmRoot"/>
-      </p:par>
-    </p:tnLst>
-  </p:timing>
 </p:sld>
 </file>
 
@@ -3778,10 +3732,9 @@
           <a:lstStyle/>
           <a:p>
             <a:r>
-              <a:rPr lang="en-US" dirty="0" smtClean="0"/>
+              <a:rPr lang="en-US" dirty="0"/>
               <a:t>Hints</a:t>
             </a:r>
-            <a:endParaRPr lang="en-US" dirty="0"/>
           </a:p>
         </p:txBody>
       </p:sp>
@@ -3806,7 +3759,7 @@
               <a:buNone/>
             </a:pPr>
             <a:r>
-              <a:rPr lang="en-US" dirty="0" smtClean="0"/>
+              <a:rPr lang="en-US" dirty="0"/>
               <a:t>You will need to use the film table.</a:t>
             </a:r>
           </a:p>
@@ -3815,10 +3768,9 @@
               <a:buNone/>
             </a:pPr>
             <a:r>
-              <a:rPr lang="en-US" dirty="0" smtClean="0"/>
+              <a:rPr lang="en-US" dirty="0"/>
               <a:t>You may also need to use BETWEEN and a WHERE statement with a comparison operator.</a:t>
             </a:r>
-            <a:endParaRPr lang="en-US" dirty="0" smtClean="0"/>
           </a:p>
         </p:txBody>
       </p:sp>
@@ -3832,13 +3784,6 @@
   <p:clrMapOvr>
     <a:masterClrMapping/>
   </p:clrMapOvr>
-  <p:timing>
-    <p:tnLst>
-      <p:par>
-        <p:cTn id="1" dur="indefinite" restart="never" nodeType="tmRoot"/>
-      </p:par>
-    </p:tnLst>
-  </p:timing>
 </p:sld>
 </file>
 
@@ -3875,10 +3820,9 @@
           <a:lstStyle/>
           <a:p>
             <a:r>
-              <a:rPr lang="en-US" dirty="0" smtClean="0"/>
+              <a:rPr lang="en-US" dirty="0"/>
               <a:t>SOLUTION</a:t>
             </a:r>
-            <a:endParaRPr lang="en-US" dirty="0"/>
           </a:p>
         </p:txBody>
       </p:sp>
@@ -3932,7 +3876,6 @@
               <a:rPr lang="en-US" b="1" dirty="0"/>
               <a:t> BETWEEN 5 AND 15;</a:t>
             </a:r>
-            <a:endParaRPr lang="en-US" b="1" dirty="0"/>
           </a:p>
         </p:txBody>
       </p:sp>
@@ -3946,13 +3889,6 @@
   <p:clrMapOvr>
     <a:masterClrMapping/>
   </p:clrMapOvr>
-  <p:timing>
-    <p:tnLst>
-      <p:par>
-        <p:cTn id="1" dur="indefinite" restart="never" nodeType="tmRoot"/>
-      </p:par>
-    </p:tnLst>
-  </p:timing>
 </p:sld>
 </file>
 
@@ -3989,10 +3925,9 @@
           <a:lstStyle/>
           <a:p>
             <a:r>
-              <a:rPr lang="en-US" dirty="0" smtClean="0"/>
+              <a:rPr lang="en-US" dirty="0"/>
               <a:t>Challenge </a:t>
             </a:r>
-            <a:endParaRPr lang="en-US" dirty="0"/>
           </a:p>
         </p:txBody>
       </p:sp>
@@ -4014,10 +3949,9 @@
           <a:lstStyle/>
           <a:p>
             <a:r>
-              <a:rPr lang="en-US" dirty="0" smtClean="0"/>
+              <a:rPr lang="en-US" dirty="0"/>
               <a:t>How many films have the word Truman somewhere in the title?</a:t>
             </a:r>
-            <a:endParaRPr lang="en-US" dirty="0" smtClean="0"/>
           </a:p>
         </p:txBody>
       </p:sp>
@@ -4031,13 +3965,6 @@
   <p:clrMapOvr>
     <a:masterClrMapping/>
   </p:clrMapOvr>
-  <p:timing>
-    <p:tnLst>
-      <p:par>
-        <p:cTn id="1" dur="indefinite" restart="never" nodeType="tmRoot"/>
-      </p:par>
-    </p:tnLst>
-  </p:timing>
 </p:sld>
 </file>
 
@@ -4074,10 +4001,9 @@
           <a:lstStyle/>
           <a:p>
             <a:r>
-              <a:rPr lang="en-US" dirty="0" smtClean="0"/>
+              <a:rPr lang="en-US" dirty="0"/>
               <a:t>Hints</a:t>
             </a:r>
-            <a:endParaRPr lang="en-US" dirty="0"/>
           </a:p>
         </p:txBody>
       </p:sp>
@@ -4102,17 +4028,16 @@
               <a:buNone/>
             </a:pPr>
             <a:r>
-              <a:rPr lang="en-US" dirty="0" smtClean="0"/>
+              <a:rPr lang="en-US" dirty="0"/>
               <a:t>You will need to use the film table</a:t>
             </a:r>
-            <a:endParaRPr lang="en-US" dirty="0"/>
           </a:p>
           <a:p>
             <a:pPr marL="0" indent="0">
               <a:buNone/>
             </a:pPr>
             <a:r>
-              <a:rPr lang="en-US" dirty="0" smtClean="0"/>
+              <a:rPr lang="en-US" dirty="0"/>
               <a:t>You will also need to use LIKE with a wildcard operator</a:t>
             </a:r>
           </a:p>
@@ -4128,13 +4053,6 @@
   <p:clrMapOvr>
     <a:masterClrMapping/>
   </p:clrMapOvr>
-  <p:timing>
-    <p:tnLst>
-      <p:par>
-        <p:cTn id="1" dur="indefinite" restart="never" nodeType="tmRoot"/>
-      </p:par>
-    </p:tnLst>
-  </p:timing>
 </p:sld>
 </file>
 
@@ -4171,10 +4089,9 @@
           <a:lstStyle/>
           <a:p>
             <a:r>
-              <a:rPr lang="en-US" dirty="0" smtClean="0"/>
+              <a:rPr lang="en-US" dirty="0"/>
               <a:t>Overview</a:t>
             </a:r>
-            <a:endParaRPr lang="en-US" dirty="0"/>
           </a:p>
         </p:txBody>
       </p:sp>
@@ -4196,19 +4113,19 @@
           <a:lstStyle/>
           <a:p>
             <a:r>
-              <a:rPr lang="en-US" dirty="0" smtClean="0"/>
+              <a:rPr lang="en-US" dirty="0"/>
               <a:t>General Challenge Tasks utilizing all the skills you’ve learned so far!</a:t>
             </a:r>
           </a:p>
           <a:p>
             <a:r>
-              <a:rPr lang="en-US" dirty="0" smtClean="0"/>
+              <a:rPr lang="en-US" dirty="0"/>
               <a:t>Hints to the challenge</a:t>
             </a:r>
           </a:p>
           <a:p>
             <a:r>
-              <a:rPr lang="en-US" dirty="0" smtClean="0"/>
+              <a:rPr lang="en-US" dirty="0"/>
               <a:t>Solution to the challenge</a:t>
             </a:r>
           </a:p>
@@ -4217,10 +4134,9 @@
           </a:p>
           <a:p>
             <a:r>
-              <a:rPr lang="en-US" dirty="0" smtClean="0"/>
+              <a:rPr lang="en-US" dirty="0"/>
               <a:t>Challenges are going to be difficult, so try breaking down the problem into individual tasks! </a:t>
             </a:r>
-            <a:endParaRPr lang="en-US" dirty="0" smtClean="0"/>
           </a:p>
         </p:txBody>
       </p:sp>
@@ -4234,13 +4150,6 @@
   <p:clrMapOvr>
     <a:masterClrMapping/>
   </p:clrMapOvr>
-  <p:timing>
-    <p:tnLst>
-      <p:par>
-        <p:cTn id="1" dur="indefinite" restart="never" nodeType="tmRoot"/>
-      </p:par>
-    </p:tnLst>
-  </p:timing>
 </p:sld>
 </file>
 
@@ -4277,10 +4186,9 @@
           <a:lstStyle/>
           <a:p>
             <a:r>
-              <a:rPr lang="en-US" dirty="0" smtClean="0"/>
+              <a:rPr lang="en-US" dirty="0"/>
               <a:t>SOLUTION</a:t>
             </a:r>
-            <a:endParaRPr lang="en-US" dirty="0"/>
           </a:p>
         </p:txBody>
       </p:sp>
@@ -4306,15 +4214,7 @@
             </a:pPr>
             <a:r>
               <a:rPr lang="en-US" b="1" dirty="0"/>
-              <a:t>SELECT </a:t>
-            </a:r>
-            <a:r>
-              <a:rPr lang="en-US" b="1" dirty="0" smtClean="0"/>
-              <a:t>COUNT(*) </a:t>
-            </a:r>
-            <a:r>
-              <a:rPr lang="en-US" b="1" dirty="0"/>
-              <a:t>FROM film</a:t>
+              <a:t>SELECT COUNT(*) FROM film</a:t>
             </a:r>
           </a:p>
           <a:p>
@@ -4325,7 +4225,6 @@
               <a:rPr lang="en-US" b="1" dirty="0"/>
               <a:t>WHERE title LIKE '%Truman%';</a:t>
             </a:r>
-            <a:endParaRPr lang="en-US" b="1" dirty="0"/>
           </a:p>
         </p:txBody>
       </p:sp>
@@ -4339,13 +4238,6 @@
   <p:clrMapOvr>
     <a:masterClrMapping/>
   </p:clrMapOvr>
-  <p:timing>
-    <p:tnLst>
-      <p:par>
-        <p:cTn id="1" dur="indefinite" restart="never" nodeType="tmRoot"/>
-      </p:par>
-    </p:tnLst>
-  </p:timing>
 </p:sld>
 </file>
 
@@ -4382,10 +4274,9 @@
           <a:lstStyle/>
           <a:p>
             <a:r>
-              <a:rPr lang="en-US" dirty="0" smtClean="0"/>
+              <a:rPr lang="en-US" dirty="0"/>
               <a:t>Great job!</a:t>
             </a:r>
-            <a:endParaRPr lang="en-US" dirty="0"/>
           </a:p>
         </p:txBody>
       </p:sp>
@@ -4405,10 +4296,9 @@
           <a:lstStyle/>
           <a:p>
             <a:r>
-              <a:rPr lang="en-US" dirty="0" smtClean="0"/>
+              <a:rPr lang="en-US" dirty="0"/>
               <a:t>Let’s go learn some more!</a:t>
             </a:r>
-            <a:endParaRPr lang="en-US" dirty="0"/>
           </a:p>
         </p:txBody>
       </p:sp>
@@ -4422,13 +4312,6 @@
   <p:clrMapOvr>
     <a:masterClrMapping/>
   </p:clrMapOvr>
-  <p:timing>
-    <p:tnLst>
-      <p:par>
-        <p:cTn id="1" dur="indefinite" restart="never" nodeType="tmRoot"/>
-      </p:par>
-    </p:tnLst>
-  </p:timing>
 </p:sld>
 </file>
 
@@ -4465,10 +4348,9 @@
           <a:lstStyle/>
           <a:p>
             <a:r>
-              <a:rPr lang="en-US" dirty="0" smtClean="0"/>
+              <a:rPr lang="en-US" dirty="0"/>
               <a:t>Challenge </a:t>
             </a:r>
-            <a:endParaRPr lang="en-US" dirty="0"/>
           </a:p>
         </p:txBody>
       </p:sp>
@@ -4490,10 +4372,9 @@
           <a:lstStyle/>
           <a:p>
             <a:r>
-              <a:rPr lang="en-US" dirty="0" smtClean="0"/>
+              <a:rPr lang="en-US" dirty="0"/>
               <a:t>How many payment transactions were greater than $5.00?</a:t>
             </a:r>
-            <a:endParaRPr lang="en-US" dirty="0" smtClean="0"/>
           </a:p>
         </p:txBody>
       </p:sp>
@@ -4507,13 +4388,6 @@
   <p:clrMapOvr>
     <a:masterClrMapping/>
   </p:clrMapOvr>
-  <p:timing>
-    <p:tnLst>
-      <p:par>
-        <p:cTn id="1" dur="indefinite" restart="never" nodeType="tmRoot"/>
-      </p:par>
-    </p:tnLst>
-  </p:timing>
 </p:sld>
 </file>
 
@@ -4550,10 +4424,9 @@
           <a:lstStyle/>
           <a:p>
             <a:r>
-              <a:rPr lang="en-US" dirty="0" smtClean="0"/>
+              <a:rPr lang="en-US" dirty="0"/>
               <a:t>Hints</a:t>
             </a:r>
-            <a:endParaRPr lang="en-US" dirty="0"/>
           </a:p>
         </p:txBody>
       </p:sp>
@@ -4578,7 +4451,7 @@
               <a:buNone/>
             </a:pPr>
             <a:r>
-              <a:rPr lang="en-US" dirty="0" smtClean="0"/>
+              <a:rPr lang="en-US" dirty="0"/>
               <a:t>You will need to use the payment table</a:t>
             </a:r>
           </a:p>
@@ -4587,10 +4460,9 @@
               <a:buNone/>
             </a:pPr>
             <a:r>
-              <a:rPr lang="en-US" dirty="0" smtClean="0"/>
+              <a:rPr lang="en-US" dirty="0"/>
               <a:t>You will also need to use COUNT and WHERE along with some comparison operator</a:t>
             </a:r>
-            <a:endParaRPr lang="en-US" dirty="0" smtClean="0"/>
           </a:p>
         </p:txBody>
       </p:sp>
@@ -4604,13 +4476,6 @@
   <p:clrMapOvr>
     <a:masterClrMapping/>
   </p:clrMapOvr>
-  <p:timing>
-    <p:tnLst>
-      <p:par>
-        <p:cTn id="1" dur="indefinite" restart="never" nodeType="tmRoot"/>
-      </p:par>
-    </p:tnLst>
-  </p:timing>
 </p:sld>
 </file>
 
@@ -4647,10 +4512,9 @@
           <a:lstStyle/>
           <a:p>
             <a:r>
-              <a:rPr lang="en-US" dirty="0" smtClean="0"/>
+              <a:rPr lang="en-US" dirty="0"/>
               <a:t>SOLUTION</a:t>
             </a:r>
-            <a:endParaRPr lang="en-US" dirty="0"/>
           </a:p>
         </p:txBody>
       </p:sp>
@@ -4687,7 +4551,6 @@
               <a:rPr lang="en-US" b="1" dirty="0"/>
               <a:t>WHERE amount &gt; 5;</a:t>
             </a:r>
-            <a:endParaRPr lang="en-US" b="1" dirty="0"/>
           </a:p>
         </p:txBody>
       </p:sp>
@@ -4701,13 +4564,6 @@
   <p:clrMapOvr>
     <a:masterClrMapping/>
   </p:clrMapOvr>
-  <p:timing>
-    <p:tnLst>
-      <p:par>
-        <p:cTn id="1" dur="indefinite" restart="never" nodeType="tmRoot"/>
-      </p:par>
-    </p:tnLst>
-  </p:timing>
 </p:sld>
 </file>
 
@@ -4744,10 +4600,9 @@
           <a:lstStyle/>
           <a:p>
             <a:r>
-              <a:rPr lang="en-US" dirty="0" smtClean="0"/>
+              <a:rPr lang="en-US" dirty="0"/>
               <a:t>Challenge </a:t>
             </a:r>
-            <a:endParaRPr lang="en-US" dirty="0"/>
           </a:p>
         </p:txBody>
       </p:sp>
@@ -4769,10 +4624,9 @@
           <a:lstStyle/>
           <a:p>
             <a:r>
-              <a:rPr lang="en-US" dirty="0" smtClean="0"/>
+              <a:rPr lang="en-US" dirty="0"/>
               <a:t>How many actors have a first name that starts with the letter P?</a:t>
             </a:r>
-            <a:endParaRPr lang="en-US" dirty="0" smtClean="0"/>
           </a:p>
         </p:txBody>
       </p:sp>
@@ -4786,13 +4640,6 @@
   <p:clrMapOvr>
     <a:masterClrMapping/>
   </p:clrMapOvr>
-  <p:timing>
-    <p:tnLst>
-      <p:par>
-        <p:cTn id="1" dur="indefinite" restart="never" nodeType="tmRoot"/>
-      </p:par>
-    </p:tnLst>
-  </p:timing>
 </p:sld>
 </file>
 
@@ -4829,10 +4676,9 @@
           <a:lstStyle/>
           <a:p>
             <a:r>
-              <a:rPr lang="en-US" dirty="0" smtClean="0"/>
+              <a:rPr lang="en-US" dirty="0"/>
               <a:t>Hints</a:t>
             </a:r>
-            <a:endParaRPr lang="en-US" dirty="0"/>
           </a:p>
         </p:txBody>
       </p:sp>
@@ -4857,7 +4703,7 @@
               <a:buNone/>
             </a:pPr>
             <a:r>
-              <a:rPr lang="en-US" dirty="0" smtClean="0"/>
+              <a:rPr lang="en-US" dirty="0"/>
               <a:t>You will need to use the actor table</a:t>
             </a:r>
           </a:p>
@@ -4866,10 +4712,9 @@
               <a:buNone/>
             </a:pPr>
             <a:r>
-              <a:rPr lang="en-US" dirty="0" smtClean="0"/>
+              <a:rPr lang="en-US" dirty="0"/>
               <a:t>You will also need to use LIKE and a wildcard operator, such as % or _ </a:t>
             </a:r>
-            <a:endParaRPr lang="en-US" dirty="0" smtClean="0"/>
           </a:p>
         </p:txBody>
       </p:sp>
@@ -4883,13 +4728,6 @@
   <p:clrMapOvr>
     <a:masterClrMapping/>
   </p:clrMapOvr>
-  <p:timing>
-    <p:tnLst>
-      <p:par>
-        <p:cTn id="1" dur="indefinite" restart="never" nodeType="tmRoot"/>
-      </p:par>
-    </p:tnLst>
-  </p:timing>
 </p:sld>
 </file>
 
@@ -4926,10 +4764,9 @@
           <a:lstStyle/>
           <a:p>
             <a:r>
-              <a:rPr lang="en-US" dirty="0" smtClean="0"/>
+              <a:rPr lang="en-US" dirty="0"/>
               <a:t>SOLUTION</a:t>
             </a:r>
-            <a:endParaRPr lang="en-US" dirty="0"/>
           </a:p>
         </p:txBody>
       </p:sp>
@@ -4974,7 +4811,6 @@
               <a:rPr lang="en-US" b="1" dirty="0"/>
               <a:t> LIKE 'P%';</a:t>
             </a:r>
-            <a:endParaRPr lang="en-US" b="1" dirty="0"/>
           </a:p>
         </p:txBody>
       </p:sp>
@@ -4988,13 +4824,6 @@
   <p:clrMapOvr>
     <a:masterClrMapping/>
   </p:clrMapOvr>
-  <p:timing>
-    <p:tnLst>
-      <p:par>
-        <p:cTn id="1" dur="indefinite" restart="never" nodeType="tmRoot"/>
-      </p:par>
-    </p:tnLst>
-  </p:timing>
 </p:sld>
 </file>
 
@@ -5031,10 +4860,9 @@
           <a:lstStyle/>
           <a:p>
             <a:r>
-              <a:rPr lang="en-US" dirty="0" smtClean="0"/>
+              <a:rPr lang="en-US" dirty="0"/>
               <a:t>Challenge </a:t>
             </a:r>
-            <a:endParaRPr lang="en-US" dirty="0"/>
           </a:p>
         </p:txBody>
       </p:sp>
@@ -5056,10 +4884,9 @@
           <a:lstStyle/>
           <a:p>
             <a:r>
-              <a:rPr lang="en-US" dirty="0" smtClean="0"/>
+              <a:rPr lang="en-US" dirty="0"/>
               <a:t>How many unique districts are our customers from?</a:t>
             </a:r>
-            <a:endParaRPr lang="en-US" dirty="0" smtClean="0"/>
           </a:p>
         </p:txBody>
       </p:sp>
@@ -5073,13 +4900,6 @@
   <p:clrMapOvr>
     <a:masterClrMapping/>
   </p:clrMapOvr>
-  <p:timing>
-    <p:tnLst>
-      <p:par>
-        <p:cTn id="1" dur="indefinite" restart="never" nodeType="tmRoot"/>
-      </p:par>
-    </p:tnLst>
-  </p:timing>
 </p:sld>
 </file>
 

</xml_diff>